<commit_message>
align figure text to center
</commit_message>
<xml_diff>
--- a/figures/figures.pptx
+++ b/figures/figures.pptx
@@ -107,6 +107,11 @@
       </a:defRPr>
     </a:lvl9pPr>
   </p:defaultTextStyle>
+  <p:extLst>
+    <p:ext uri="{EFAFB233-063F-42B5-8137-9DF3F51BA10A}">
+      <p15:sldGuideLst xmlns:p15="http://schemas.microsoft.com/office/powerpoint/2012/main"/>
+    </p:ext>
+  </p:extLst>
 </p:presentation>
 </file>
 
@@ -5011,7 +5016,7 @@
         </p:nvSpPr>
         <p:spPr>
           <a:xfrm>
-            <a:off x="6386368" y="4371643"/>
+            <a:off x="6041735" y="4434056"/>
             <a:ext cx="1396133" cy="369332"/>
           </a:xfrm>
           <a:prstGeom prst="rect">

</xml_diff>

<commit_message>
revise after proof-reading work
</commit_message>
<xml_diff>
--- a/figures/figures.pptx
+++ b/figures/figures.pptx
@@ -197,7 +197,7 @@
           <a:p>
             <a:fld id="{BE2D50FE-3811-934D-93B4-00DE54C93A01}" type="datetimeFigureOut">
               <a:rPr kumimoji="1" lang="ko-KR" altLang="en-US" smtClean="0"/>
-              <a:t>2018. 1. 27.</a:t>
+              <a:t>2018. 3. 5.</a:t>
             </a:fld>
             <a:endParaRPr kumimoji="1" lang="ko-KR" altLang="en-US"/>
           </a:p>
@@ -695,7 +695,7 @@
           <a:p>
             <a:fld id="{6BE0CF94-88AD-2548-B044-7511C4158495}" type="datetimeFigureOut">
               <a:rPr kumimoji="1" lang="ko-KR" altLang="en-US" smtClean="0"/>
-              <a:t>2018. 1. 27.</a:t>
+              <a:t>2018. 3. 5.</a:t>
             </a:fld>
             <a:endParaRPr kumimoji="1" lang="ko-KR" altLang="en-US"/>
           </a:p>
@@ -893,7 +893,7 @@
           <a:p>
             <a:fld id="{6BE0CF94-88AD-2548-B044-7511C4158495}" type="datetimeFigureOut">
               <a:rPr kumimoji="1" lang="ko-KR" altLang="en-US" smtClean="0"/>
-              <a:t>2018. 1. 27.</a:t>
+              <a:t>2018. 3. 5.</a:t>
             </a:fld>
             <a:endParaRPr kumimoji="1" lang="ko-KR" altLang="en-US"/>
           </a:p>
@@ -1101,7 +1101,7 @@
           <a:p>
             <a:fld id="{6BE0CF94-88AD-2548-B044-7511C4158495}" type="datetimeFigureOut">
               <a:rPr kumimoji="1" lang="ko-KR" altLang="en-US" smtClean="0"/>
-              <a:t>2018. 1. 27.</a:t>
+              <a:t>2018. 3. 5.</a:t>
             </a:fld>
             <a:endParaRPr kumimoji="1" lang="ko-KR" altLang="en-US"/>
           </a:p>
@@ -1299,7 +1299,7 @@
           <a:p>
             <a:fld id="{6BE0CF94-88AD-2548-B044-7511C4158495}" type="datetimeFigureOut">
               <a:rPr kumimoji="1" lang="ko-KR" altLang="en-US" smtClean="0"/>
-              <a:t>2018. 1. 27.</a:t>
+              <a:t>2018. 3. 5.</a:t>
             </a:fld>
             <a:endParaRPr kumimoji="1" lang="ko-KR" altLang="en-US"/>
           </a:p>
@@ -1574,7 +1574,7 @@
           <a:p>
             <a:fld id="{6BE0CF94-88AD-2548-B044-7511C4158495}" type="datetimeFigureOut">
               <a:rPr kumimoji="1" lang="ko-KR" altLang="en-US" smtClean="0"/>
-              <a:t>2018. 1. 27.</a:t>
+              <a:t>2018. 3. 5.</a:t>
             </a:fld>
             <a:endParaRPr kumimoji="1" lang="ko-KR" altLang="en-US"/>
           </a:p>
@@ -1839,7 +1839,7 @@
           <a:p>
             <a:fld id="{6BE0CF94-88AD-2548-B044-7511C4158495}" type="datetimeFigureOut">
               <a:rPr kumimoji="1" lang="ko-KR" altLang="en-US" smtClean="0"/>
-              <a:t>2018. 1. 27.</a:t>
+              <a:t>2018. 3. 5.</a:t>
             </a:fld>
             <a:endParaRPr kumimoji="1" lang="ko-KR" altLang="en-US"/>
           </a:p>
@@ -2251,7 +2251,7 @@
           <a:p>
             <a:fld id="{6BE0CF94-88AD-2548-B044-7511C4158495}" type="datetimeFigureOut">
               <a:rPr kumimoji="1" lang="ko-KR" altLang="en-US" smtClean="0"/>
-              <a:t>2018. 1. 27.</a:t>
+              <a:t>2018. 3. 5.</a:t>
             </a:fld>
             <a:endParaRPr kumimoji="1" lang="ko-KR" altLang="en-US"/>
           </a:p>
@@ -2392,7 +2392,7 @@
           <a:p>
             <a:fld id="{6BE0CF94-88AD-2548-B044-7511C4158495}" type="datetimeFigureOut">
               <a:rPr kumimoji="1" lang="ko-KR" altLang="en-US" smtClean="0"/>
-              <a:t>2018. 1. 27.</a:t>
+              <a:t>2018. 3. 5.</a:t>
             </a:fld>
             <a:endParaRPr kumimoji="1" lang="ko-KR" altLang="en-US"/>
           </a:p>
@@ -2505,7 +2505,7 @@
           <a:p>
             <a:fld id="{6BE0CF94-88AD-2548-B044-7511C4158495}" type="datetimeFigureOut">
               <a:rPr kumimoji="1" lang="ko-KR" altLang="en-US" smtClean="0"/>
-              <a:t>2018. 1. 27.</a:t>
+              <a:t>2018. 3. 5.</a:t>
             </a:fld>
             <a:endParaRPr kumimoji="1" lang="ko-KR" altLang="en-US"/>
           </a:p>
@@ -2816,7 +2816,7 @@
           <a:p>
             <a:fld id="{6BE0CF94-88AD-2548-B044-7511C4158495}" type="datetimeFigureOut">
               <a:rPr kumimoji="1" lang="ko-KR" altLang="en-US" smtClean="0"/>
-              <a:t>2018. 1. 27.</a:t>
+              <a:t>2018. 3. 5.</a:t>
             </a:fld>
             <a:endParaRPr kumimoji="1" lang="ko-KR" altLang="en-US"/>
           </a:p>
@@ -3104,7 +3104,7 @@
           <a:p>
             <a:fld id="{6BE0CF94-88AD-2548-B044-7511C4158495}" type="datetimeFigureOut">
               <a:rPr kumimoji="1" lang="ko-KR" altLang="en-US" smtClean="0"/>
-              <a:t>2018. 1. 27.</a:t>
+              <a:t>2018. 3. 5.</a:t>
             </a:fld>
             <a:endParaRPr kumimoji="1" lang="ko-KR" altLang="en-US"/>
           </a:p>
@@ -3345,7 +3345,7 @@
           <a:p>
             <a:fld id="{6BE0CF94-88AD-2548-B044-7511C4158495}" type="datetimeFigureOut">
               <a:rPr kumimoji="1" lang="ko-KR" altLang="en-US" smtClean="0"/>
-              <a:t>2018. 1. 27.</a:t>
+              <a:t>2018. 3. 5.</a:t>
             </a:fld>
             <a:endParaRPr kumimoji="1" lang="ko-KR" altLang="en-US"/>
           </a:p>
@@ -4569,8 +4569,8 @@
         </p:nvSpPr>
         <p:spPr>
           <a:xfrm>
-            <a:off x="1067708" y="797069"/>
-            <a:ext cx="302223" cy="369332"/>
+            <a:off x="1010028" y="775803"/>
+            <a:ext cx="402435" cy="369332"/>
           </a:xfrm>
           <a:prstGeom prst="rect">
             <a:avLst/>
@@ -4585,8 +4585,8 @@
           <a:p>
             <a:pPr algn="ctr"/>
             <a:r>
-              <a:rPr kumimoji="1" lang="en-US" altLang="ko-KR" b="1" dirty="0"/>
-              <a:t>n</a:t>
+              <a:rPr kumimoji="1" lang="en-US" altLang="ko-KR" b="1" dirty="0" err="1"/>
+              <a:t>lr</a:t>
             </a:r>
             <a:endParaRPr kumimoji="1" lang="ko-KR" altLang="en-US" b="1" dirty="0"/>
           </a:p>
@@ -4606,8 +4606,8 @@
         </p:nvSpPr>
         <p:spPr>
           <a:xfrm>
-            <a:off x="1280418" y="581102"/>
-            <a:ext cx="302223" cy="369332"/>
+            <a:off x="1209786" y="581102"/>
+            <a:ext cx="443488" cy="369332"/>
           </a:xfrm>
           <a:prstGeom prst="rect">
             <a:avLst/>
@@ -4622,8 +4622,8 @@
           <a:p>
             <a:pPr algn="ctr"/>
             <a:r>
-              <a:rPr kumimoji="1" lang="en-US" altLang="ko-KR" b="1" dirty="0"/>
-              <a:t>k</a:t>
+              <a:rPr kumimoji="1" lang="en-US" altLang="ko-KR" b="1" dirty="0" err="1"/>
+              <a:t>lc</a:t>
             </a:r>
             <a:endParaRPr kumimoji="1" lang="ko-KR" altLang="en-US" b="1" dirty="0"/>
           </a:p>
@@ -4643,8 +4643,8 @@
         </p:nvSpPr>
         <p:spPr>
           <a:xfrm>
-            <a:off x="1963306" y="581102"/>
-            <a:ext cx="302223" cy="369332"/>
+            <a:off x="1892596" y="581102"/>
+            <a:ext cx="443644" cy="369332"/>
           </a:xfrm>
           <a:prstGeom prst="rect">
             <a:avLst/>
@@ -4659,8 +4659,8 @@
           <a:p>
             <a:pPr algn="ctr"/>
             <a:r>
-              <a:rPr kumimoji="1" lang="en-US" altLang="ko-KR" b="1" dirty="0"/>
-              <a:t>m</a:t>
+              <a:rPr kumimoji="1" lang="en-US" altLang="ko-KR" b="1" dirty="0" err="1"/>
+              <a:t>rc</a:t>
             </a:r>
             <a:endParaRPr kumimoji="1" lang="ko-KR" altLang="en-US" b="1" dirty="0"/>
           </a:p>
@@ -4680,8 +4680,8 @@
         </p:nvSpPr>
         <p:spPr>
           <a:xfrm>
-            <a:off x="2188514" y="797068"/>
-            <a:ext cx="302223" cy="369332"/>
+            <a:off x="1720672" y="786435"/>
+            <a:ext cx="418269" cy="369332"/>
           </a:xfrm>
           <a:prstGeom prst="rect">
             <a:avLst/>
@@ -4696,8 +4696,8 @@
           <a:p>
             <a:pPr algn="ctr"/>
             <a:r>
-              <a:rPr kumimoji="1" lang="en-US" altLang="ko-KR" b="1" dirty="0"/>
-              <a:t>k</a:t>
+              <a:rPr kumimoji="1" lang="en-US" altLang="ko-KR" b="1" dirty="0" err="1"/>
+              <a:t>lc</a:t>
             </a:r>
             <a:endParaRPr kumimoji="1" lang="ko-KR" altLang="en-US" b="1" dirty="0"/>
           </a:p>
@@ -4757,8 +4757,8 @@
         </p:nvSpPr>
         <p:spPr>
           <a:xfrm>
-            <a:off x="3188326" y="907225"/>
-            <a:ext cx="302223" cy="400110"/>
+            <a:off x="2934967" y="790262"/>
+            <a:ext cx="808942" cy="400110"/>
           </a:xfrm>
           <a:prstGeom prst="rect">
             <a:avLst/>
@@ -4773,8 +4773,8 @@
           <a:p>
             <a:pPr algn="ctr"/>
             <a:r>
-              <a:rPr kumimoji="1" lang="en-US" altLang="ko-KR" sz="2000" b="1" dirty="0"/>
-              <a:t>n</a:t>
+              <a:rPr kumimoji="1" lang="en-US" altLang="ko-KR" sz="2000" b="1" dirty="0" err="1"/>
+              <a:t>lr</a:t>
             </a:r>
             <a:endParaRPr kumimoji="1" lang="ko-KR" altLang="en-US" sz="2000" b="1" dirty="0"/>
           </a:p>
@@ -4794,8 +4794,8 @@
         </p:nvSpPr>
         <p:spPr>
           <a:xfrm>
-            <a:off x="3180078" y="1283035"/>
-            <a:ext cx="302223" cy="400110"/>
+            <a:off x="2926116" y="1166072"/>
+            <a:ext cx="810148" cy="400110"/>
           </a:xfrm>
           <a:prstGeom prst="rect">
             <a:avLst/>
@@ -4810,8 +4810,8 @@
           <a:p>
             <a:pPr algn="ctr"/>
             <a:r>
-              <a:rPr kumimoji="1" lang="en-US" altLang="ko-KR" sz="2000" b="1" dirty="0"/>
-              <a:t>k</a:t>
+              <a:rPr kumimoji="1" lang="en-US" altLang="ko-KR" sz="2000" b="1" dirty="0" err="1"/>
+              <a:t>lc</a:t>
             </a:r>
             <a:endParaRPr kumimoji="1" lang="ko-KR" altLang="en-US" sz="2000" b="1" dirty="0"/>
           </a:p>
@@ -4831,8 +4831,8 @@
         </p:nvSpPr>
         <p:spPr>
           <a:xfrm>
-            <a:off x="3174258" y="1622629"/>
-            <a:ext cx="302223" cy="400110"/>
+            <a:off x="2893907" y="1505666"/>
+            <a:ext cx="862926" cy="400110"/>
           </a:xfrm>
           <a:prstGeom prst="rect">
             <a:avLst/>
@@ -4847,8 +4847,8 @@
           <a:p>
             <a:pPr algn="ctr"/>
             <a:r>
-              <a:rPr kumimoji="1" lang="en-US" altLang="ko-KR" sz="2000" b="1" dirty="0"/>
-              <a:t>m</a:t>
+              <a:rPr kumimoji="1" lang="en-US" altLang="ko-KR" sz="2000" b="1" dirty="0" err="1"/>
+              <a:t>rc</a:t>
             </a:r>
             <a:endParaRPr kumimoji="1" lang="ko-KR" altLang="en-US" sz="2000" b="1" dirty="0"/>
           </a:p>
@@ -4868,7 +4868,7 @@
         </p:nvSpPr>
         <p:spPr>
           <a:xfrm>
-            <a:off x="2757540" y="3309031"/>
+            <a:off x="2757540" y="3542953"/>
             <a:ext cx="1135660" cy="400110"/>
           </a:xfrm>
           <a:prstGeom prst="rect">
@@ -4884,8 +4884,24 @@
           <a:p>
             <a:pPr algn="ctr"/>
             <a:r>
+              <a:rPr kumimoji="1" lang="en-US" altLang="ko-KR" sz="2000" b="1" dirty="0" err="1"/>
+              <a:t>lr</a:t>
+            </a:r>
+            <a:r>
               <a:rPr kumimoji="1" lang="en-US" altLang="ko-KR" sz="2000" b="1" dirty="0"/>
-              <a:t>n*k*m</a:t>
+              <a:t>*</a:t>
+            </a:r>
+            <a:r>
+              <a:rPr kumimoji="1" lang="en-US" altLang="ko-KR" sz="2000" b="1" dirty="0" err="1"/>
+              <a:t>lc</a:t>
+            </a:r>
+            <a:r>
+              <a:rPr kumimoji="1" lang="en-US" altLang="ko-KR" sz="2000" b="1" dirty="0"/>
+              <a:t>*</a:t>
+            </a:r>
+            <a:r>
+              <a:rPr kumimoji="1" lang="en-US" altLang="ko-KR" sz="2000" b="1" dirty="0" err="1"/>
+              <a:t>rc</a:t>
             </a:r>
             <a:endParaRPr kumimoji="1" lang="ko-KR" altLang="en-US" sz="2000" b="1" dirty="0"/>
           </a:p>
@@ -4905,7 +4921,7 @@
         </p:nvSpPr>
         <p:spPr>
           <a:xfrm>
-            <a:off x="2757540" y="2874581"/>
+            <a:off x="2757540" y="2725719"/>
             <a:ext cx="1135660" cy="400110"/>
           </a:xfrm>
           <a:prstGeom prst="rect">
@@ -4921,8 +4937,16 @@
           <a:p>
             <a:pPr algn="ctr"/>
             <a:r>
+              <a:rPr kumimoji="1" lang="en-US" altLang="ko-KR" sz="2000" b="1" dirty="0" err="1"/>
+              <a:t>lr</a:t>
+            </a:r>
+            <a:r>
               <a:rPr kumimoji="1" lang="en-US" altLang="ko-KR" sz="2000" b="1" dirty="0"/>
-              <a:t>n*m</a:t>
+              <a:t>*</a:t>
+            </a:r>
+            <a:r>
+              <a:rPr kumimoji="1" lang="en-US" altLang="ko-KR" sz="2000" b="1" dirty="0" err="1"/>
+              <a:t>rc</a:t>
             </a:r>
             <a:endParaRPr kumimoji="1" lang="ko-KR" altLang="en-US" sz="2000" b="1" dirty="0"/>
           </a:p>
@@ -4942,7 +4966,7 @@
         </p:nvSpPr>
         <p:spPr>
           <a:xfrm>
-            <a:off x="2771607" y="2428143"/>
+            <a:off x="2771607" y="2311180"/>
             <a:ext cx="1135660" cy="400110"/>
           </a:xfrm>
           <a:prstGeom prst="rect">
@@ -4958,8 +4982,16 @@
           <a:p>
             <a:pPr algn="ctr"/>
             <a:r>
+              <a:rPr kumimoji="1" lang="en-US" altLang="ko-KR" sz="2000" b="1" dirty="0" err="1"/>
+              <a:t>lc</a:t>
+            </a:r>
+            <a:r>
               <a:rPr kumimoji="1" lang="en-US" altLang="ko-KR" sz="2000" b="1" dirty="0"/>
-              <a:t>k*m</a:t>
+              <a:t>*</a:t>
+            </a:r>
+            <a:r>
+              <a:rPr kumimoji="1" lang="en-US" altLang="ko-KR" sz="2000" b="1" dirty="0" err="1"/>
+              <a:t>rc</a:t>
             </a:r>
             <a:endParaRPr kumimoji="1" lang="ko-KR" altLang="en-US" sz="2000" b="1" dirty="0"/>
           </a:p>
@@ -4979,7 +5011,7 @@
         </p:nvSpPr>
         <p:spPr>
           <a:xfrm>
-            <a:off x="2757539" y="2018611"/>
+            <a:off x="2757539" y="1901648"/>
             <a:ext cx="1135660" cy="400110"/>
           </a:xfrm>
           <a:prstGeom prst="rect">
@@ -4995,8 +5027,16 @@
           <a:p>
             <a:pPr algn="ctr"/>
             <a:r>
+              <a:rPr kumimoji="1" lang="en-US" altLang="ko-KR" sz="2000" b="1" dirty="0" err="1"/>
+              <a:t>lr</a:t>
+            </a:r>
+            <a:r>
               <a:rPr kumimoji="1" lang="en-US" altLang="ko-KR" sz="2000" b="1" dirty="0"/>
-              <a:t>n*k</a:t>
+              <a:t>*</a:t>
+            </a:r>
+            <a:r>
+              <a:rPr kumimoji="1" lang="en-US" altLang="ko-KR" sz="2000" b="1" dirty="0" err="1"/>
+              <a:t>lc</a:t>
             </a:r>
             <a:endParaRPr kumimoji="1" lang="ko-KR" altLang="en-US" sz="2000" b="1" dirty="0"/>
           </a:p>
@@ -10139,8 +10179,8 @@
         </p:nvSpPr>
         <p:spPr>
           <a:xfrm>
-            <a:off x="2767575" y="484094"/>
-            <a:ext cx="1086282" cy="3829737"/>
+            <a:off x="2642478" y="484094"/>
+            <a:ext cx="1336476" cy="3829737"/>
           </a:xfrm>
           <a:prstGeom prst="roundRect">
             <a:avLst/>
@@ -10270,6 +10310,59 @@
           <a:p>
             <a:pPr algn="ctr"/>
             <a:endParaRPr kumimoji="1" lang="ko-KR" altLang="en-US"/>
+          </a:p>
+        </p:txBody>
+      </p:sp>
+      <p:sp>
+        <p:nvSpPr>
+          <p:cNvPr id="89" name="텍스트상자 88">
+            <a:extLst>
+              <a:ext uri="{FF2B5EF4-FFF2-40B4-BE49-F238E27FC236}">
+                <a16:creationId xmlns:a16="http://schemas.microsoft.com/office/drawing/2014/main" id="{E53A292E-FAF3-5D4E-9360-EE9713DC52E4}"/>
+              </a:ext>
+            </a:extLst>
+          </p:cNvPr>
+          <p:cNvSpPr txBox="1"/>
+          <p:nvPr/>
+        </p:nvSpPr>
+        <p:spPr>
+          <a:xfrm>
+            <a:off x="2602305" y="3125247"/>
+            <a:ext cx="1412608" cy="400110"/>
+          </a:xfrm>
+          <a:prstGeom prst="rect">
+            <a:avLst/>
+          </a:prstGeom>
+          <a:noFill/>
+        </p:spPr>
+        <p:txBody>
+          <a:bodyPr wrap="square" rtlCol="0">
+            <a:spAutoFit/>
+          </a:bodyPr>
+          <a:lstStyle/>
+          <a:p>
+            <a:pPr algn="ctr"/>
+            <a:r>
+              <a:rPr kumimoji="1" lang="en-US" altLang="ko-KR" sz="2000" b="1" dirty="0" err="1"/>
+              <a:t>lr</a:t>
+            </a:r>
+            <a:r>
+              <a:rPr kumimoji="1" lang="en-US" altLang="ko-KR" sz="2000" b="1" dirty="0"/>
+              <a:t>*</a:t>
+            </a:r>
+            <a:r>
+              <a:rPr kumimoji="1" lang="en-US" altLang="ko-KR" sz="2000" b="1" dirty="0" err="1"/>
+              <a:t>lc+lc</a:t>
+            </a:r>
+            <a:r>
+              <a:rPr kumimoji="1" lang="en-US" altLang="ko-KR" sz="2000" b="1" dirty="0"/>
+              <a:t>*</a:t>
+            </a:r>
+            <a:r>
+              <a:rPr kumimoji="1" lang="en-US" altLang="ko-KR" sz="2000" b="1" dirty="0" err="1"/>
+              <a:t>rc</a:t>
+            </a:r>
+            <a:endParaRPr kumimoji="1" lang="ko-KR" altLang="en-US" sz="2000" b="1" dirty="0"/>
           </a:p>
         </p:txBody>
       </p:sp>

</xml_diff>